<commit_message>
adding recap slide to pptx
</commit_message>
<xml_diff>
--- a/Presentation 4/Final Presentation.pptx
+++ b/Presentation 4/Final Presentation.pptx
@@ -5,29 +5,30 @@
     <p:sldMasterId id="2147483672" r:id="rId1"/>
   </p:sldMasterIdLst>
   <p:notesMasterIdLst>
-    <p:notesMasterId r:id="rId19"/>
+    <p:notesMasterId r:id="rId20"/>
   </p:notesMasterIdLst>
   <p:handoutMasterIdLst>
-    <p:handoutMasterId r:id="rId20"/>
+    <p:handoutMasterId r:id="rId21"/>
   </p:handoutMasterIdLst>
   <p:sldIdLst>
     <p:sldId id="282" r:id="rId2"/>
-    <p:sldId id="283" r:id="rId3"/>
-    <p:sldId id="286" r:id="rId4"/>
-    <p:sldId id="293" r:id="rId5"/>
-    <p:sldId id="296" r:id="rId6"/>
-    <p:sldId id="298" r:id="rId7"/>
-    <p:sldId id="297" r:id="rId8"/>
-    <p:sldId id="285" r:id="rId9"/>
-    <p:sldId id="290" r:id="rId10"/>
-    <p:sldId id="291" r:id="rId11"/>
-    <p:sldId id="288" r:id="rId12"/>
-    <p:sldId id="289" r:id="rId13"/>
-    <p:sldId id="287" r:id="rId14"/>
-    <p:sldId id="284" r:id="rId15"/>
-    <p:sldId id="294" r:id="rId16"/>
-    <p:sldId id="295" r:id="rId17"/>
-    <p:sldId id="292" r:id="rId18"/>
+    <p:sldId id="299" r:id="rId3"/>
+    <p:sldId id="283" r:id="rId4"/>
+    <p:sldId id="286" r:id="rId5"/>
+    <p:sldId id="293" r:id="rId6"/>
+    <p:sldId id="296" r:id="rId7"/>
+    <p:sldId id="298" r:id="rId8"/>
+    <p:sldId id="297" r:id="rId9"/>
+    <p:sldId id="285" r:id="rId10"/>
+    <p:sldId id="290" r:id="rId11"/>
+    <p:sldId id="291" r:id="rId12"/>
+    <p:sldId id="288" r:id="rId13"/>
+    <p:sldId id="289" r:id="rId14"/>
+    <p:sldId id="287" r:id="rId15"/>
+    <p:sldId id="284" r:id="rId16"/>
+    <p:sldId id="294" r:id="rId17"/>
+    <p:sldId id="295" r:id="rId18"/>
+    <p:sldId id="292" r:id="rId19"/>
   </p:sldIdLst>
   <p:sldSz cx="12192000" cy="6858000"/>
   <p:notesSz cx="6858000" cy="9144000"/>
@@ -4847,6 +4848,102 @@
       </p:grpSpPr>
       <p:pic>
         <p:nvPicPr>
+          <p:cNvPr id="3074" name="Picture 2"/>
+          <p:cNvPicPr>
+            <a:picLocks noChangeAspect="1" noChangeArrowheads="1"/>
+          </p:cNvPicPr>
+          <p:nvPr/>
+        </p:nvPicPr>
+        <p:blipFill>
+          <a:blip r:embed="rId2">
+            <a:extLst>
+              <a:ext uri="{28A0092B-C50C-407E-A947-70E740481C1C}">
+                <a14:useLocalDpi xmlns:a14="http://schemas.microsoft.com/office/drawing/2010/main" val="0"/>
+              </a:ext>
+            </a:extLst>
+          </a:blip>
+          <a:srcRect/>
+          <a:stretch>
+            <a:fillRect/>
+          </a:stretch>
+        </p:blipFill>
+        <p:spPr bwMode="auto">
+          <a:xfrm>
+            <a:off x="1202795" y="368830"/>
+            <a:ext cx="9575801" cy="6115050"/>
+          </a:xfrm>
+          <a:prstGeom prst="rect">
+            <a:avLst/>
+          </a:prstGeom>
+          <a:noFill/>
+          <a:ln>
+            <a:noFill/>
+          </a:ln>
+          <a:extLst>
+            <a:ext uri="{909E8E84-426E-40DD-AFC4-6F175D3DCCD1}">
+              <a14:hiddenFill xmlns:a14="http://schemas.microsoft.com/office/drawing/2010/main">
+                <a:solidFill>
+                  <a:srgbClr val="FFFFFF"/>
+                </a:solidFill>
+              </a14:hiddenFill>
+            </a:ext>
+            <a:ext uri="{91240B29-F687-4F45-9708-019B960494DF}">
+              <a14:hiddenLine xmlns:a14="http://schemas.microsoft.com/office/drawing/2010/main" w="12700" cap="flat">
+                <a:solidFill>
+                  <a:srgbClr val="000000"/>
+                </a:solidFill>
+                <a:miter lim="800000"/>
+                <a:headEnd/>
+                <a:tailEnd/>
+              </a14:hiddenLine>
+            </a:ext>
+          </a:extLst>
+        </p:spPr>
+      </p:pic>
+    </p:spTree>
+    <p:extLst>
+      <p:ext uri="{BB962C8B-B14F-4D97-AF65-F5344CB8AC3E}">
+        <p14:creationId xmlns:p14="http://schemas.microsoft.com/office/powerpoint/2010/main" val="3090146345"/>
+      </p:ext>
+    </p:extLst>
+  </p:cSld>
+  <p:clrMapOvr>
+    <a:masterClrMapping/>
+  </p:clrMapOvr>
+  <mc:AlternateContent xmlns:mc="http://schemas.openxmlformats.org/markup-compatibility/2006" xmlns:p14="http://schemas.microsoft.com/office/powerpoint/2010/main">
+    <mc:Choice Requires="p14">
+      <p:transition spd="med" p14:dur="700">
+        <p:fade/>
+      </p:transition>
+    </mc:Choice>
+    <mc:Fallback xmlns="">
+      <p:transition spd="med">
+        <p:fade/>
+      </p:transition>
+    </mc:Fallback>
+  </mc:AlternateContent>
+</p:sld>
+</file>
+
+<file path=ppt/slides/slide11.xml><?xml version="1.0" encoding="utf-8"?>
+<p:sld xmlns:a="http://schemas.openxmlformats.org/drawingml/2006/main" xmlns:r="http://schemas.openxmlformats.org/officeDocument/2006/relationships" xmlns:p="http://schemas.openxmlformats.org/presentationml/2006/main">
+  <p:cSld>
+    <p:spTree>
+      <p:nvGrpSpPr>
+        <p:cNvPr id="1" name=""/>
+        <p:cNvGrpSpPr/>
+        <p:nvPr/>
+      </p:nvGrpSpPr>
+      <p:grpSpPr>
+        <a:xfrm>
+          <a:off x="0" y="0"/>
+          <a:ext cx="0" cy="0"/>
+          <a:chOff x="0" y="0"/>
+          <a:chExt cx="0" cy="0"/>
+        </a:xfrm>
+      </p:grpSpPr>
+      <p:pic>
+        <p:nvPicPr>
           <p:cNvPr id="4098" name="Picture 2"/>
           <p:cNvPicPr>
             <a:picLocks noChangeAspect="1" noChangeArrowheads="1"/>
@@ -4978,7 +5075,7 @@
 </p:sld>
 </file>
 
-<file path=ppt/slides/slide11.xml><?xml version="1.0" encoding="utf-8"?>
+<file path=ppt/slides/slide12.xml><?xml version="1.0" encoding="utf-8"?>
 <p:sld xmlns:a="http://schemas.openxmlformats.org/drawingml/2006/main" xmlns:r="http://schemas.openxmlformats.org/officeDocument/2006/relationships" xmlns:p="http://schemas.openxmlformats.org/presentationml/2006/main">
   <p:cSld>
     <p:spTree>
@@ -5128,7 +5225,7 @@
 </p:sld>
 </file>
 
-<file path=ppt/slides/slide12.xml><?xml version="1.0" encoding="utf-8"?>
+<file path=ppt/slides/slide13.xml><?xml version="1.0" encoding="utf-8"?>
 <p:sld xmlns:a="http://schemas.openxmlformats.org/drawingml/2006/main" xmlns:r="http://schemas.openxmlformats.org/officeDocument/2006/relationships" xmlns:p="http://schemas.openxmlformats.org/presentationml/2006/main">
   <p:cSld>
     <p:spTree>
@@ -5224,7 +5321,7 @@
 </p:sld>
 </file>
 
-<file path=ppt/slides/slide13.xml><?xml version="1.0" encoding="utf-8"?>
+<file path=ppt/slides/slide14.xml><?xml version="1.0" encoding="utf-8"?>
 <p:sld xmlns:a="http://schemas.openxmlformats.org/drawingml/2006/main" xmlns:r="http://schemas.openxmlformats.org/officeDocument/2006/relationships" xmlns:p="http://schemas.openxmlformats.org/presentationml/2006/main">
   <p:cSld>
     <p:spTree>
@@ -5364,7 +5461,7 @@
 </p:sld>
 </file>
 
-<file path=ppt/slides/slide14.xml><?xml version="1.0" encoding="utf-8"?>
+<file path=ppt/slides/slide15.xml><?xml version="1.0" encoding="utf-8"?>
 <p:sld xmlns:a="http://schemas.openxmlformats.org/drawingml/2006/main" xmlns:r="http://schemas.openxmlformats.org/officeDocument/2006/relationships" xmlns:p="http://schemas.openxmlformats.org/presentationml/2006/main">
   <p:cSld>
     <p:spTree>
@@ -5488,7 +5585,7 @@
 </p:sld>
 </file>
 
-<file path=ppt/slides/slide15.xml><?xml version="1.0" encoding="utf-8"?>
+<file path=ppt/slides/slide16.xml><?xml version="1.0" encoding="utf-8"?>
 <p:sld xmlns:a="http://schemas.openxmlformats.org/drawingml/2006/main" xmlns:r="http://schemas.openxmlformats.org/officeDocument/2006/relationships" xmlns:p="http://schemas.openxmlformats.org/presentationml/2006/main">
   <p:cSld>
     <p:spTree>
@@ -5638,7 +5735,7 @@
 </p:sld>
 </file>
 
-<file path=ppt/slides/slide16.xml><?xml version="1.0" encoding="utf-8"?>
+<file path=ppt/slides/slide17.xml><?xml version="1.0" encoding="utf-8"?>
 <p:sld xmlns:a="http://schemas.openxmlformats.org/drawingml/2006/main" xmlns:r="http://schemas.openxmlformats.org/officeDocument/2006/relationships" xmlns:p="http://schemas.openxmlformats.org/presentationml/2006/main">
   <p:cSld>
     <p:spTree>
@@ -5788,7 +5885,7 @@
 </p:sld>
 </file>
 
-<file path=ppt/slides/slide17.xml><?xml version="1.0" encoding="utf-8"?>
+<file path=ppt/slides/slide18.xml><?xml version="1.0" encoding="utf-8"?>
 <p:sld xmlns:a="http://schemas.openxmlformats.org/drawingml/2006/main" xmlns:r="http://schemas.openxmlformats.org/officeDocument/2006/relationships" xmlns:p="http://schemas.openxmlformats.org/presentationml/2006/main">
   <p:cSld>
     <p:spTree>
@@ -5884,6 +5981,148 @@
 </file>
 
 <file path=ppt/slides/slide2.xml><?xml version="1.0" encoding="utf-8"?>
+<p:sld xmlns:a="http://schemas.openxmlformats.org/drawingml/2006/main" xmlns:r="http://schemas.openxmlformats.org/officeDocument/2006/relationships" xmlns:p="http://schemas.openxmlformats.org/presentationml/2006/main">
+  <p:cSld>
+    <p:spTree>
+      <p:nvGrpSpPr>
+        <p:cNvPr id="1" name=""/>
+        <p:cNvGrpSpPr/>
+        <p:nvPr/>
+      </p:nvGrpSpPr>
+      <p:grpSpPr>
+        <a:xfrm>
+          <a:off x="0" y="0"/>
+          <a:ext cx="0" cy="0"/>
+          <a:chOff x="0" y="0"/>
+          <a:chExt cx="0" cy="0"/>
+        </a:xfrm>
+      </p:grpSpPr>
+      <p:sp>
+        <p:nvSpPr>
+          <p:cNvPr id="2" name="Title 1">
+            <a:extLst>
+              <a:ext uri="{FF2B5EF4-FFF2-40B4-BE49-F238E27FC236}">
+                <a16:creationId xmlns:a16="http://schemas.microsoft.com/office/drawing/2014/main" id="{512BC764-0766-4004-9BD1-A61A7123BEB1}"/>
+              </a:ext>
+            </a:extLst>
+          </p:cNvPr>
+          <p:cNvSpPr>
+            <a:spLocks noGrp="1"/>
+          </p:cNvSpPr>
+          <p:nvPr>
+            <p:ph type="title"/>
+          </p:nvPr>
+        </p:nvSpPr>
+        <p:spPr/>
+        <p:txBody>
+          <a:bodyPr/>
+          <a:lstStyle/>
+          <a:p>
+            <a:r>
+              <a:rPr lang="en-US" dirty="0"/>
+              <a:t>RECAP</a:t>
+            </a:r>
+          </a:p>
+        </p:txBody>
+      </p:sp>
+      <p:sp>
+        <p:nvSpPr>
+          <p:cNvPr id="3" name="Content Placeholder 2">
+            <a:extLst>
+              <a:ext uri="{FF2B5EF4-FFF2-40B4-BE49-F238E27FC236}">
+                <a16:creationId xmlns:a16="http://schemas.microsoft.com/office/drawing/2014/main" id="{9DF85A9B-34C8-47B9-B17B-B6825BACA6ED}"/>
+              </a:ext>
+            </a:extLst>
+          </p:cNvPr>
+          <p:cNvSpPr>
+            <a:spLocks noGrp="1"/>
+          </p:cNvSpPr>
+          <p:nvPr>
+            <p:ph idx="1"/>
+          </p:nvPr>
+        </p:nvSpPr>
+        <p:spPr>
+          <a:xfrm>
+            <a:off x="507999" y="1719071"/>
+            <a:ext cx="11210524" cy="4783082"/>
+          </a:xfrm>
+        </p:spPr>
+        <p:txBody>
+          <a:bodyPr/>
+          <a:lstStyle/>
+          <a:p>
+            <a:r>
+              <a:rPr lang="en-US" dirty="0"/>
+              <a:t>Description of Banqi</a:t>
+            </a:r>
+          </a:p>
+          <a:p>
+            <a:pPr lvl="1"/>
+            <a:r>
+              <a:rPr lang="en-US" dirty="0"/>
+              <a:t>Half/Blind Chinese Chess – game consists of tokens with various power levels, each placed face-down on the board in a random position. Tokens must be flipped face up (revealing color/power level) before you can move them – higher power level tokens can take higher power level tokens.</a:t>
+            </a:r>
+          </a:p>
+          <a:p>
+            <a:endParaRPr lang="en-US" dirty="0"/>
+          </a:p>
+          <a:p>
+            <a:r>
+              <a:rPr lang="en-US" dirty="0"/>
+              <a:t>How much progress had we made at the end of the last increment?</a:t>
+            </a:r>
+          </a:p>
+          <a:p>
+            <a:pPr lvl="1"/>
+            <a:r>
+              <a:rPr lang="en-US" dirty="0"/>
+              <a:t>Full implementation of the game (including the UI for the game); but only little progress for the database/server side of things</a:t>
+            </a:r>
+          </a:p>
+          <a:p>
+            <a:endParaRPr lang="en-US" dirty="0"/>
+          </a:p>
+          <a:p>
+            <a:r>
+              <a:rPr lang="en-US" dirty="0"/>
+              <a:t>Where are we at now?</a:t>
+            </a:r>
+          </a:p>
+          <a:p>
+            <a:pPr lvl="1"/>
+            <a:r>
+              <a:rPr lang="en-US" dirty="0"/>
+              <a:t>(Almost) fully functional, satisfying all of the core requirements excluding </a:t>
+            </a:r>
+          </a:p>
+        </p:txBody>
+      </p:sp>
+    </p:spTree>
+    <p:extLst>
+      <p:ext uri="{BB962C8B-B14F-4D97-AF65-F5344CB8AC3E}">
+        <p14:creationId xmlns:p14="http://schemas.microsoft.com/office/powerpoint/2010/main" val="3066764656"/>
+      </p:ext>
+    </p:extLst>
+  </p:cSld>
+  <p:clrMapOvr>
+    <a:masterClrMapping/>
+  </p:clrMapOvr>
+  <mc:AlternateContent xmlns:mc="http://schemas.openxmlformats.org/markup-compatibility/2006" xmlns:p14="http://schemas.microsoft.com/office/powerpoint/2010/main">
+    <mc:Choice Requires="p14">
+      <p:transition spd="med" p14:dur="700">
+        <p:fade/>
+      </p:transition>
+    </mc:Choice>
+    <mc:Fallback xmlns="">
+      <p:transition spd="med">
+        <p:fade/>
+      </p:transition>
+    </mc:Fallback>
+  </mc:AlternateContent>
+</p:sld>
+</file>
+
+<file path=ppt/slides/slide3.xml><?xml version="1.0" encoding="utf-8"?>
 <p:sld xmlns:a="http://schemas.openxmlformats.org/drawingml/2006/main" xmlns:r="http://schemas.openxmlformats.org/officeDocument/2006/relationships" xmlns:p="http://schemas.openxmlformats.org/presentationml/2006/main">
   <p:cSld>
     <p:spTree>
@@ -5988,7 +6227,7 @@
 </p:sld>
 </file>
 
-<file path=ppt/slides/slide3.xml><?xml version="1.0" encoding="utf-8"?>
+<file path=ppt/slides/slide4.xml><?xml version="1.0" encoding="utf-8"?>
 <p:sld xmlns:a="http://schemas.openxmlformats.org/drawingml/2006/main" xmlns:r="http://schemas.openxmlformats.org/officeDocument/2006/relationships" xmlns:p="http://schemas.openxmlformats.org/presentationml/2006/main">
   <p:cSld>
     <p:spTree>
@@ -6093,7 +6332,7 @@
 </p:sld>
 </file>
 
-<file path=ppt/slides/slide4.xml><?xml version="1.0" encoding="utf-8"?>
+<file path=ppt/slides/slide5.xml><?xml version="1.0" encoding="utf-8"?>
 <p:sld xmlns:a="http://schemas.openxmlformats.org/drawingml/2006/main" xmlns:r="http://schemas.openxmlformats.org/officeDocument/2006/relationships" xmlns:p="http://schemas.openxmlformats.org/presentationml/2006/main">
   <p:cSld>
     <p:spTree>
@@ -6192,7 +6431,7 @@
 </p:sld>
 </file>
 
-<file path=ppt/slides/slide5.xml><?xml version="1.0" encoding="utf-8"?>
+<file path=ppt/slides/slide6.xml><?xml version="1.0" encoding="utf-8"?>
 <p:sld xmlns:a="http://schemas.openxmlformats.org/drawingml/2006/main" xmlns:r="http://schemas.openxmlformats.org/officeDocument/2006/relationships" xmlns:p="http://schemas.openxmlformats.org/presentationml/2006/main">
   <p:cSld>
     <p:spTree>
@@ -6291,7 +6530,7 @@
 </p:sld>
 </file>
 
-<file path=ppt/slides/slide6.xml><?xml version="1.0" encoding="utf-8"?>
+<file path=ppt/slides/slide7.xml><?xml version="1.0" encoding="utf-8"?>
 <p:sld xmlns:a="http://schemas.openxmlformats.org/drawingml/2006/main" xmlns:r="http://schemas.openxmlformats.org/officeDocument/2006/relationships" xmlns:p="http://schemas.openxmlformats.org/presentationml/2006/main">
   <p:cSld>
     <p:spTree>
@@ -6390,7 +6629,7 @@
 </p:sld>
 </file>
 
-<file path=ppt/slides/slide7.xml><?xml version="1.0" encoding="utf-8"?>
+<file path=ppt/slides/slide8.xml><?xml version="1.0" encoding="utf-8"?>
 <p:sld xmlns:a="http://schemas.openxmlformats.org/drawingml/2006/main" xmlns:r="http://schemas.openxmlformats.org/officeDocument/2006/relationships" xmlns:p="http://schemas.openxmlformats.org/presentationml/2006/main">
   <p:cSld>
     <p:spTree>
@@ -6489,7 +6728,7 @@
 </p:sld>
 </file>
 
-<file path=ppt/slides/slide8.xml><?xml version="1.0" encoding="utf-8"?>
+<file path=ppt/slides/slide9.xml><?xml version="1.0" encoding="utf-8"?>
 <p:sld xmlns:a="http://schemas.openxmlformats.org/drawingml/2006/main" xmlns:r="http://schemas.openxmlformats.org/officeDocument/2006/relationships" xmlns:p="http://schemas.openxmlformats.org/presentationml/2006/main">
   <p:cSld>
     <p:spTree>
@@ -6592,102 +6831,6 @@
     <p:extLst>
       <p:ext uri="{BB962C8B-B14F-4D97-AF65-F5344CB8AC3E}">
         <p14:creationId xmlns:p14="http://schemas.microsoft.com/office/powerpoint/2010/main" val="3703138513"/>
-      </p:ext>
-    </p:extLst>
-  </p:cSld>
-  <p:clrMapOvr>
-    <a:masterClrMapping/>
-  </p:clrMapOvr>
-  <mc:AlternateContent xmlns:mc="http://schemas.openxmlformats.org/markup-compatibility/2006" xmlns:p14="http://schemas.microsoft.com/office/powerpoint/2010/main">
-    <mc:Choice Requires="p14">
-      <p:transition spd="med" p14:dur="700">
-        <p:fade/>
-      </p:transition>
-    </mc:Choice>
-    <mc:Fallback xmlns="">
-      <p:transition spd="med">
-        <p:fade/>
-      </p:transition>
-    </mc:Fallback>
-  </mc:AlternateContent>
-</p:sld>
-</file>
-
-<file path=ppt/slides/slide9.xml><?xml version="1.0" encoding="utf-8"?>
-<p:sld xmlns:a="http://schemas.openxmlformats.org/drawingml/2006/main" xmlns:r="http://schemas.openxmlformats.org/officeDocument/2006/relationships" xmlns:p="http://schemas.openxmlformats.org/presentationml/2006/main">
-  <p:cSld>
-    <p:spTree>
-      <p:nvGrpSpPr>
-        <p:cNvPr id="1" name=""/>
-        <p:cNvGrpSpPr/>
-        <p:nvPr/>
-      </p:nvGrpSpPr>
-      <p:grpSpPr>
-        <a:xfrm>
-          <a:off x="0" y="0"/>
-          <a:ext cx="0" cy="0"/>
-          <a:chOff x="0" y="0"/>
-          <a:chExt cx="0" cy="0"/>
-        </a:xfrm>
-      </p:grpSpPr>
-      <p:pic>
-        <p:nvPicPr>
-          <p:cNvPr id="3074" name="Picture 2"/>
-          <p:cNvPicPr>
-            <a:picLocks noChangeAspect="1" noChangeArrowheads="1"/>
-          </p:cNvPicPr>
-          <p:nvPr/>
-        </p:nvPicPr>
-        <p:blipFill>
-          <a:blip r:embed="rId2">
-            <a:extLst>
-              <a:ext uri="{28A0092B-C50C-407E-A947-70E740481C1C}">
-                <a14:useLocalDpi xmlns:a14="http://schemas.microsoft.com/office/drawing/2010/main" val="0"/>
-              </a:ext>
-            </a:extLst>
-          </a:blip>
-          <a:srcRect/>
-          <a:stretch>
-            <a:fillRect/>
-          </a:stretch>
-        </p:blipFill>
-        <p:spPr bwMode="auto">
-          <a:xfrm>
-            <a:off x="1202795" y="368830"/>
-            <a:ext cx="9575801" cy="6115050"/>
-          </a:xfrm>
-          <a:prstGeom prst="rect">
-            <a:avLst/>
-          </a:prstGeom>
-          <a:noFill/>
-          <a:ln>
-            <a:noFill/>
-          </a:ln>
-          <a:extLst>
-            <a:ext uri="{909E8E84-426E-40DD-AFC4-6F175D3DCCD1}">
-              <a14:hiddenFill xmlns:a14="http://schemas.microsoft.com/office/drawing/2010/main">
-                <a:solidFill>
-                  <a:srgbClr val="FFFFFF"/>
-                </a:solidFill>
-              </a14:hiddenFill>
-            </a:ext>
-            <a:ext uri="{91240B29-F687-4F45-9708-019B960494DF}">
-              <a14:hiddenLine xmlns:a14="http://schemas.microsoft.com/office/drawing/2010/main" w="12700" cap="flat">
-                <a:solidFill>
-                  <a:srgbClr val="000000"/>
-                </a:solidFill>
-                <a:miter lim="800000"/>
-                <a:headEnd/>
-                <a:tailEnd/>
-              </a14:hiddenLine>
-            </a:ext>
-          </a:extLst>
-        </p:spPr>
-      </p:pic>
-    </p:spTree>
-    <p:extLst>
-      <p:ext uri="{BB962C8B-B14F-4D97-AF65-F5344CB8AC3E}">
-        <p14:creationId xmlns:p14="http://schemas.microsoft.com/office/powerpoint/2010/main" val="3090146345"/>
       </p:ext>
     </p:extLst>
   </p:cSld>

</xml_diff>